<commit_message>
remove 0 and -0 labels on qnm barplots
</commit_message>
<xml_diff>
--- a/figures/main/policy_moments_timeline/pol_mom_timeline.pptx
+++ b/figures/main/policy_moments_timeline/pol_mom_timeline.pptx
@@ -105,6 +105,11 @@
       </a:defRPr>
     </a:lvl9pPr>
   </p:defaultTextStyle>
+  <p:extLst>
+    <p:ext uri="{EFAFB233-063F-42B5-8137-9DF3F51BA10A}">
+      <p15:sldGuideLst xmlns:p15="http://schemas.microsoft.com/office/powerpoint/2012/main"/>
+    </p:ext>
+  </p:extLst>
 </p:presentation>
 </file>
 
@@ -239,7 +244,7 @@
           <a:p>
             <a:fld id="{E2198713-0E35-4040-B9F0-3DD5AEE47015}" type="datetimeFigureOut">
               <a:rPr lang="en-US" smtClean="0"/>
-              <a:t>11/10/2025</a:t>
+              <a:t>11/11/2025</a:t>
             </a:fld>
             <a:endParaRPr lang="en-US"/>
           </a:p>
@@ -409,7 +414,7 @@
           <a:p>
             <a:fld id="{E2198713-0E35-4040-B9F0-3DD5AEE47015}" type="datetimeFigureOut">
               <a:rPr lang="en-US" smtClean="0"/>
-              <a:t>11/10/2025</a:t>
+              <a:t>11/11/2025</a:t>
             </a:fld>
             <a:endParaRPr lang="en-US"/>
           </a:p>
@@ -589,7 +594,7 @@
           <a:p>
             <a:fld id="{E2198713-0E35-4040-B9F0-3DD5AEE47015}" type="datetimeFigureOut">
               <a:rPr lang="en-US" smtClean="0"/>
-              <a:t>11/10/2025</a:t>
+              <a:t>11/11/2025</a:t>
             </a:fld>
             <a:endParaRPr lang="en-US"/>
           </a:p>
@@ -759,7 +764,7 @@
           <a:p>
             <a:fld id="{E2198713-0E35-4040-B9F0-3DD5AEE47015}" type="datetimeFigureOut">
               <a:rPr lang="en-US" smtClean="0"/>
-              <a:t>11/10/2025</a:t>
+              <a:t>11/11/2025</a:t>
             </a:fld>
             <a:endParaRPr lang="en-US"/>
           </a:p>
@@ -1005,7 +1010,7 @@
           <a:p>
             <a:fld id="{E2198713-0E35-4040-B9F0-3DD5AEE47015}" type="datetimeFigureOut">
               <a:rPr lang="en-US" smtClean="0"/>
-              <a:t>11/10/2025</a:t>
+              <a:t>11/11/2025</a:t>
             </a:fld>
             <a:endParaRPr lang="en-US"/>
           </a:p>
@@ -1237,7 +1242,7 @@
           <a:p>
             <a:fld id="{E2198713-0E35-4040-B9F0-3DD5AEE47015}" type="datetimeFigureOut">
               <a:rPr lang="en-US" smtClean="0"/>
-              <a:t>11/10/2025</a:t>
+              <a:t>11/11/2025</a:t>
             </a:fld>
             <a:endParaRPr lang="en-US"/>
           </a:p>
@@ -1604,7 +1609,7 @@
           <a:p>
             <a:fld id="{E2198713-0E35-4040-B9F0-3DD5AEE47015}" type="datetimeFigureOut">
               <a:rPr lang="en-US" smtClean="0"/>
-              <a:t>11/10/2025</a:t>
+              <a:t>11/11/2025</a:t>
             </a:fld>
             <a:endParaRPr lang="en-US"/>
           </a:p>
@@ -1722,7 +1727,7 @@
           <a:p>
             <a:fld id="{E2198713-0E35-4040-B9F0-3DD5AEE47015}" type="datetimeFigureOut">
               <a:rPr lang="en-US" smtClean="0"/>
-              <a:t>11/10/2025</a:t>
+              <a:t>11/11/2025</a:t>
             </a:fld>
             <a:endParaRPr lang="en-US"/>
           </a:p>
@@ -1817,7 +1822,7 @@
           <a:p>
             <a:fld id="{E2198713-0E35-4040-B9F0-3DD5AEE47015}" type="datetimeFigureOut">
               <a:rPr lang="en-US" smtClean="0"/>
-              <a:t>11/10/2025</a:t>
+              <a:t>11/11/2025</a:t>
             </a:fld>
             <a:endParaRPr lang="en-US"/>
           </a:p>
@@ -2094,7 +2099,7 @@
           <a:p>
             <a:fld id="{E2198713-0E35-4040-B9F0-3DD5AEE47015}" type="datetimeFigureOut">
               <a:rPr lang="en-US" smtClean="0"/>
-              <a:t>11/10/2025</a:t>
+              <a:t>11/11/2025</a:t>
             </a:fld>
             <a:endParaRPr lang="en-US"/>
           </a:p>
@@ -2351,7 +2356,7 @@
           <a:p>
             <a:fld id="{E2198713-0E35-4040-B9F0-3DD5AEE47015}" type="datetimeFigureOut">
               <a:rPr lang="en-US" smtClean="0"/>
-              <a:t>11/10/2025</a:t>
+              <a:t>11/11/2025</a:t>
             </a:fld>
             <a:endParaRPr lang="en-US"/>
           </a:p>
@@ -2564,7 +2569,7 @@
           <a:p>
             <a:fld id="{E2198713-0E35-4040-B9F0-3DD5AEE47015}" type="datetimeFigureOut">
               <a:rPr lang="en-US" smtClean="0"/>
-              <a:t>11/10/2025</a:t>
+              <a:t>11/11/2025</a:t>
             </a:fld>
             <a:endParaRPr lang="en-US"/>
           </a:p>
@@ -3112,13 +3117,14 @@
           <a:gradFill flip="none" rotWithShape="1">
             <a:gsLst>
               <a:gs pos="0">
-                <a:schemeClr val="bg1">
-                  <a:lumMod val="85000"/>
+                <a:schemeClr val="tx2">
+                  <a:lumMod val="20000"/>
+                  <a:lumOff val="80000"/>
                 </a:schemeClr>
               </a:gs>
               <a:gs pos="96000">
-                <a:schemeClr val="bg2">
-                  <a:lumMod val="10000"/>
+                <a:schemeClr val="accent1">
+                  <a:lumMod val="50000"/>
                 </a:schemeClr>
               </a:gs>
             </a:gsLst>
@@ -3262,6 +3268,7 @@
             <a:solidFill>
               <a:srgbClr val="FE98D2"/>
             </a:solidFill>
+            <a:prstDash val="sysDot"/>
           </a:ln>
         </p:spPr>
         <p:style>
@@ -3297,6 +3304,7 @@
             <a:solidFill>
               <a:srgbClr val="8E8AFE"/>
             </a:solidFill>
+            <a:prstDash val="sysDot"/>
           </a:ln>
         </p:spPr>
         <p:style>
@@ -3633,7 +3641,7 @@
         </p:nvSpPr>
         <p:spPr>
           <a:xfrm rot="8232473">
-            <a:off x="29998" y="263683"/>
+            <a:off x="29936" y="1267154"/>
             <a:ext cx="1143412" cy="1181042"/>
           </a:xfrm>
           <a:prstGeom prst="teardrop">
@@ -3642,10 +3650,13 @@
           <a:solidFill>
             <a:srgbClr val="FE98D2"/>
           </a:solidFill>
-          <a:ln>
+          <a:ln w="34925">
             <a:solidFill>
-              <a:srgbClr val="FE98D2"/>
+              <a:schemeClr val="bg2">
+                <a:lumMod val="50000"/>
+              </a:schemeClr>
             </a:solidFill>
+            <a:prstDash val="sysDash"/>
           </a:ln>
         </p:spPr>
         <p:style>
@@ -3681,7 +3692,7 @@
         </p:nvSpPr>
         <p:spPr>
           <a:xfrm>
-            <a:off x="116840" y="709509"/>
+            <a:off x="116778" y="1712980"/>
             <a:ext cx="995680" cy="369332"/>
           </a:xfrm>
           <a:prstGeom prst="rect">
@@ -3712,140 +3723,30 @@
           </a:p>
         </p:txBody>
       </p:sp>
-      <p:grpSp>
-        <p:nvGrpSpPr>
-          <p:cNvPr id="47" name="Groupe 46"/>
-          <p:cNvGrpSpPr/>
-          <p:nvPr/>
-        </p:nvGrpSpPr>
-        <p:grpSpPr>
-          <a:xfrm>
+      <p:sp>
+        <p:nvSpPr>
+          <p:cNvPr id="26" name="Larme 25"/>
+          <p:cNvSpPr/>
+          <p:nvPr/>
+        </p:nvSpPr>
+        <p:spPr>
+          <a:xfrm rot="8232473">
             <a:off x="1860914" y="1340648"/>
             <a:ext cx="1143412" cy="1181042"/>
-            <a:chOff x="1860914" y="985043"/>
-            <a:chExt cx="1143412" cy="1181042"/>
-          </a:xfrm>
-        </p:grpSpPr>
-        <p:sp>
-          <p:nvSpPr>
-            <p:cNvPr id="26" name="Larme 25"/>
-            <p:cNvSpPr/>
-            <p:nvPr/>
-          </p:nvSpPr>
-          <p:spPr>
-            <a:xfrm rot="8232473">
-              <a:off x="1860914" y="985043"/>
-              <a:ext cx="1143412" cy="1181042"/>
-            </a:xfrm>
-            <a:prstGeom prst="teardrop">
-              <a:avLst/>
-            </a:prstGeom>
+          </a:xfrm>
+          <a:prstGeom prst="teardrop">
+            <a:avLst/>
+          </a:prstGeom>
+          <a:solidFill>
+            <a:srgbClr val="8E8AFE"/>
+          </a:solidFill>
+          <a:ln w="34925">
             <a:solidFill>
-              <a:srgbClr val="8E8AFE"/>
+              <a:schemeClr val="bg2">
+                <a:lumMod val="50000"/>
+              </a:schemeClr>
             </a:solidFill>
-            <a:ln>
-              <a:solidFill>
-                <a:srgbClr val="8E8AFE"/>
-              </a:solidFill>
-            </a:ln>
-          </p:spPr>
-          <p:style>
-            <a:lnRef idx="2">
-              <a:schemeClr val="accent1">
-                <a:shade val="50000"/>
-              </a:schemeClr>
-            </a:lnRef>
-            <a:fillRef idx="1">
-              <a:schemeClr val="accent1"/>
-            </a:fillRef>
-            <a:effectRef idx="0">
-              <a:schemeClr val="accent1"/>
-            </a:effectRef>
-            <a:fontRef idx="minor">
-              <a:schemeClr val="lt1"/>
-            </a:fontRef>
-          </p:style>
-          <p:txBody>
-            <a:bodyPr rtlCol="0" anchor="ctr"/>
-            <a:lstStyle/>
-            <a:p>
-              <a:pPr algn="ctr"/>
-              <a:endParaRPr lang="en-US" dirty="0"/>
-            </a:p>
-          </p:txBody>
-        </p:sp>
-        <p:sp>
-          <p:nvSpPr>
-            <p:cNvPr id="27" name="ZoneTexte 26"/>
-            <p:cNvSpPr txBox="1"/>
-            <p:nvPr/>
-          </p:nvSpPr>
-          <p:spPr>
-            <a:xfrm>
-              <a:off x="1934780" y="1222980"/>
-              <a:ext cx="995680" cy="646331"/>
-            </a:xfrm>
-            <a:prstGeom prst="rect">
-              <a:avLst/>
-            </a:prstGeom>
-            <a:noFill/>
-          </p:spPr>
-          <p:txBody>
-            <a:bodyPr wrap="square" rtlCol="0">
-              <a:spAutoFit/>
-            </a:bodyPr>
-            <a:lstStyle/>
-            <a:p>
-              <a:pPr algn="ctr"/>
-              <a:r>
-                <a:rPr lang="en-US" dirty="0" smtClean="0">
-                  <a:solidFill>
-                    <a:schemeClr val="bg1"/>
-                  </a:solidFill>
-                </a:rPr>
-                <a:t>Kyoto</a:t>
-              </a:r>
-            </a:p>
-            <a:p>
-              <a:pPr algn="ctr"/>
-              <a:r>
-                <a:rPr lang="en-US" dirty="0" smtClean="0">
-                  <a:solidFill>
-                    <a:schemeClr val="bg1"/>
-                  </a:solidFill>
-                </a:rPr>
-                <a:t>Protocol</a:t>
-              </a:r>
-              <a:endParaRPr lang="en-US" dirty="0">
-                <a:solidFill>
-                  <a:schemeClr val="bg1"/>
-                </a:solidFill>
-              </a:endParaRPr>
-            </a:p>
-          </p:txBody>
-        </p:sp>
-      </p:grpSp>
-      <p:sp>
-        <p:nvSpPr>
-          <p:cNvPr id="29" name="Larme 28"/>
-          <p:cNvSpPr/>
-          <p:nvPr/>
-        </p:nvSpPr>
-        <p:spPr>
-          <a:xfrm rot="8232473">
-            <a:off x="5167051" y="1952325"/>
-            <a:ext cx="1143412" cy="1181042"/>
-          </a:xfrm>
-          <a:prstGeom prst="teardrop">
-            <a:avLst/>
-          </a:prstGeom>
-          <a:solidFill>
-            <a:srgbClr val="E4B556"/>
-          </a:solidFill>
-          <a:ln>
-            <a:solidFill>
-              <a:schemeClr val="bg1"/>
-            </a:solidFill>
+            <a:prstDash val="sysDash"/>
           </a:ln>
         </p:spPr>
         <p:style>
@@ -3875,14 +3776,14 @@
       </p:sp>
       <p:sp>
         <p:nvSpPr>
-          <p:cNvPr id="30" name="ZoneTexte 29"/>
+          <p:cNvPr id="27" name="ZoneTexte 26"/>
           <p:cNvSpPr txBox="1"/>
           <p:nvPr/>
         </p:nvSpPr>
         <p:spPr>
           <a:xfrm>
-            <a:off x="5171440" y="2190262"/>
-            <a:ext cx="1065157" cy="646331"/>
+            <a:off x="1934780" y="1578585"/>
+            <a:ext cx="995680" cy="646331"/>
           </a:xfrm>
           <a:prstGeom prst="rect">
             <a:avLst/>
@@ -3897,14 +3798,25 @@
           <a:p>
             <a:pPr algn="ctr"/>
             <a:r>
-              <a:rPr lang="en-US" sz="1200" dirty="0" smtClean="0">
+              <a:rPr lang="en-US" dirty="0" smtClean="0">
                 <a:solidFill>
                   <a:schemeClr val="bg1"/>
                 </a:solidFill>
               </a:rPr>
-              <a:t> Clean Development Mechanism</a:t>
-            </a:r>
-            <a:endParaRPr lang="en-US" sz="1200" dirty="0">
+              <a:t>Kyoto</a:t>
+            </a:r>
+          </a:p>
+          <a:p>
+            <a:pPr algn="ctr"/>
+            <a:r>
+              <a:rPr lang="en-US" dirty="0" smtClean="0">
+                <a:solidFill>
+                  <a:schemeClr val="bg1"/>
+                </a:solidFill>
+              </a:rPr>
+              <a:t>Protocol</a:t>
+            </a:r>
+            <a:endParaRPr lang="en-US" dirty="0">
               <a:solidFill>
                 <a:schemeClr val="bg1"/>
               </a:solidFill>
@@ -3914,24 +3826,24 @@
       </p:sp>
       <p:sp>
         <p:nvSpPr>
-          <p:cNvPr id="31" name="Larme 30"/>
+          <p:cNvPr id="29" name="Larme 28"/>
           <p:cNvSpPr/>
           <p:nvPr/>
         </p:nvSpPr>
         <p:spPr>
           <a:xfrm rot="8232473">
-            <a:off x="5867967" y="264721"/>
+            <a:off x="5167051" y="1952325"/>
             <a:ext cx="1143412" cy="1181042"/>
           </a:xfrm>
           <a:prstGeom prst="teardrop">
             <a:avLst/>
           </a:prstGeom>
           <a:solidFill>
-            <a:srgbClr val="F8756B"/>
+            <a:srgbClr val="DDA22B"/>
           </a:solidFill>
           <a:ln>
             <a:solidFill>
-              <a:schemeClr val="bg1"/>
+              <a:srgbClr val="E4B556"/>
             </a:solidFill>
           </a:ln>
         </p:spPr>
@@ -3962,14 +3874,14 @@
       </p:sp>
       <p:sp>
         <p:nvSpPr>
-          <p:cNvPr id="32" name="ZoneTexte 31"/>
+          <p:cNvPr id="30" name="ZoneTexte 29"/>
           <p:cNvSpPr txBox="1"/>
           <p:nvPr/>
         </p:nvSpPr>
         <p:spPr>
           <a:xfrm>
-            <a:off x="5872356" y="502658"/>
-            <a:ext cx="1065157" cy="830997"/>
+            <a:off x="5171440" y="2190262"/>
+            <a:ext cx="1065157" cy="646331"/>
           </a:xfrm>
           <a:prstGeom prst="rect">
             <a:avLst/>
@@ -3984,36 +3896,14 @@
           <a:p>
             <a:pPr algn="ctr"/>
             <a:r>
-              <a:rPr lang="en-US" sz="1600" dirty="0" smtClean="0">
+              <a:rPr lang="en-US" sz="1200" dirty="0" smtClean="0">
                 <a:solidFill>
                   <a:schemeClr val="bg1"/>
                 </a:solidFill>
               </a:rPr>
-              <a:t> 2008/9</a:t>
-            </a:r>
-          </a:p>
-          <a:p>
-            <a:pPr algn="ctr"/>
-            <a:r>
-              <a:rPr lang="en-US" sz="1600" dirty="0" smtClean="0">
-                <a:solidFill>
-                  <a:schemeClr val="bg1"/>
-                </a:solidFill>
-              </a:rPr>
-              <a:t>Financial</a:t>
-            </a:r>
-          </a:p>
-          <a:p>
-            <a:pPr algn="ctr"/>
-            <a:r>
-              <a:rPr lang="en-US" sz="1600" dirty="0" smtClean="0">
-                <a:solidFill>
-                  <a:schemeClr val="bg1"/>
-                </a:solidFill>
-              </a:rPr>
-              <a:t>Crisis</a:t>
-            </a:r>
-            <a:endParaRPr lang="en-US" sz="1600" dirty="0">
+              <a:t> Clean Development Mechanism</a:t>
+            </a:r>
+            <a:endParaRPr lang="en-US" sz="1200" dirty="0">
               <a:solidFill>
                 <a:schemeClr val="bg1"/>
               </a:solidFill>
@@ -4023,24 +3913,24 @@
       </p:sp>
       <p:sp>
         <p:nvSpPr>
-          <p:cNvPr id="33" name="Larme 32"/>
+          <p:cNvPr id="31" name="Larme 30"/>
           <p:cNvSpPr/>
           <p:nvPr/>
         </p:nvSpPr>
         <p:spPr>
           <a:xfrm rot="8232473">
-            <a:off x="6631132" y="1360896"/>
+            <a:off x="5867967" y="264721"/>
             <a:ext cx="1143412" cy="1181042"/>
           </a:xfrm>
           <a:prstGeom prst="teardrop">
             <a:avLst/>
           </a:prstGeom>
           <a:solidFill>
-            <a:srgbClr val="03BFC5"/>
+            <a:srgbClr val="F8756B"/>
           </a:solidFill>
           <a:ln>
             <a:solidFill>
-              <a:schemeClr val="bg1"/>
+              <a:srgbClr val="F8756B"/>
             </a:solidFill>
           </a:ln>
         </p:spPr>
@@ -4071,13 +3961,13 @@
       </p:sp>
       <p:sp>
         <p:nvSpPr>
-          <p:cNvPr id="34" name="ZoneTexte 33"/>
+          <p:cNvPr id="32" name="ZoneTexte 31"/>
           <p:cNvSpPr txBox="1"/>
           <p:nvPr/>
         </p:nvSpPr>
         <p:spPr>
           <a:xfrm>
-            <a:off x="6635521" y="1598833"/>
+            <a:off x="5872356" y="502658"/>
             <a:ext cx="1065157" cy="830997"/>
           </a:xfrm>
           <a:prstGeom prst="rect">
@@ -4098,45 +3988,29 @@
                   <a:schemeClr val="bg1"/>
                 </a:solidFill>
               </a:rPr>
-              <a:t> IMO</a:t>
+              <a:t> 2008/9</a:t>
             </a:r>
           </a:p>
           <a:p>
             <a:pPr algn="ctr"/>
-            <a:r>
-              <a:rPr lang="en-US" sz="1600" dirty="0">
-                <a:solidFill>
-                  <a:schemeClr val="bg1"/>
-                </a:solidFill>
-              </a:rPr>
-              <a:t>e</a:t>
-            </a:r>
             <a:r>
               <a:rPr lang="en-US" sz="1600" dirty="0" smtClean="0">
                 <a:solidFill>
                   <a:schemeClr val="bg1"/>
                 </a:solidFill>
               </a:rPr>
-              <a:t>fficiency</a:t>
+              <a:t>Financial</a:t>
             </a:r>
           </a:p>
           <a:p>
             <a:pPr algn="ctr"/>
-            <a:r>
-              <a:rPr lang="en-US" sz="1600" dirty="0">
-                <a:solidFill>
-                  <a:schemeClr val="bg1"/>
-                </a:solidFill>
-              </a:rPr>
-              <a:t>p</a:t>
-            </a:r>
             <a:r>
               <a:rPr lang="en-US" sz="1600" dirty="0" smtClean="0">
                 <a:solidFill>
                   <a:schemeClr val="bg1"/>
                 </a:solidFill>
               </a:rPr>
-              <a:t>olicies</a:t>
+              <a:t>Crisis</a:t>
             </a:r>
             <a:endParaRPr lang="en-US" sz="1600" dirty="0">
               <a:solidFill>
@@ -4148,24 +4022,24 @@
       </p:sp>
       <p:sp>
         <p:nvSpPr>
-          <p:cNvPr id="35" name="Larme 34"/>
+          <p:cNvPr id="33" name="Larme 32"/>
           <p:cNvSpPr/>
           <p:nvPr/>
         </p:nvSpPr>
         <p:spPr>
           <a:xfrm rot="8232473">
-            <a:off x="8068677" y="193245"/>
+            <a:off x="6631132" y="1360896"/>
             <a:ext cx="1143412" cy="1181042"/>
           </a:xfrm>
           <a:prstGeom prst="teardrop">
             <a:avLst/>
           </a:prstGeom>
           <a:solidFill>
-            <a:srgbClr val="38B600"/>
+            <a:srgbClr val="03BFC5"/>
           </a:solidFill>
           <a:ln>
             <a:solidFill>
-              <a:schemeClr val="bg1"/>
+              <a:srgbClr val="03BFC5"/>
             </a:solidFill>
           </a:ln>
         </p:spPr>
@@ -4196,6 +4070,131 @@
       </p:sp>
       <p:sp>
         <p:nvSpPr>
+          <p:cNvPr id="34" name="ZoneTexte 33"/>
+          <p:cNvSpPr txBox="1"/>
+          <p:nvPr/>
+        </p:nvSpPr>
+        <p:spPr>
+          <a:xfrm>
+            <a:off x="6635521" y="1598833"/>
+            <a:ext cx="1065157" cy="830997"/>
+          </a:xfrm>
+          <a:prstGeom prst="rect">
+            <a:avLst/>
+          </a:prstGeom>
+          <a:noFill/>
+        </p:spPr>
+        <p:txBody>
+          <a:bodyPr wrap="square" rtlCol="0">
+            <a:spAutoFit/>
+          </a:bodyPr>
+          <a:lstStyle/>
+          <a:p>
+            <a:pPr algn="ctr"/>
+            <a:r>
+              <a:rPr lang="en-US" sz="1600" dirty="0" smtClean="0">
+                <a:solidFill>
+                  <a:schemeClr val="bg1"/>
+                </a:solidFill>
+              </a:rPr>
+              <a:t> IMO</a:t>
+            </a:r>
+          </a:p>
+          <a:p>
+            <a:pPr algn="ctr"/>
+            <a:r>
+              <a:rPr lang="en-US" sz="1600" dirty="0">
+                <a:solidFill>
+                  <a:schemeClr val="bg1"/>
+                </a:solidFill>
+              </a:rPr>
+              <a:t>e</a:t>
+            </a:r>
+            <a:r>
+              <a:rPr lang="en-US" sz="1600" dirty="0" smtClean="0">
+                <a:solidFill>
+                  <a:schemeClr val="bg1"/>
+                </a:solidFill>
+              </a:rPr>
+              <a:t>fficiency</a:t>
+            </a:r>
+          </a:p>
+          <a:p>
+            <a:pPr algn="ctr"/>
+            <a:r>
+              <a:rPr lang="en-US" sz="1600" dirty="0">
+                <a:solidFill>
+                  <a:schemeClr val="bg1"/>
+                </a:solidFill>
+              </a:rPr>
+              <a:t>p</a:t>
+            </a:r>
+            <a:r>
+              <a:rPr lang="en-US" sz="1600" dirty="0" smtClean="0">
+                <a:solidFill>
+                  <a:schemeClr val="bg1"/>
+                </a:solidFill>
+              </a:rPr>
+              <a:t>olicies</a:t>
+            </a:r>
+            <a:endParaRPr lang="en-US" sz="1600" dirty="0">
+              <a:solidFill>
+                <a:schemeClr val="bg1"/>
+              </a:solidFill>
+            </a:endParaRPr>
+          </a:p>
+        </p:txBody>
+      </p:sp>
+      <p:sp>
+        <p:nvSpPr>
+          <p:cNvPr id="35" name="Larme 34"/>
+          <p:cNvSpPr/>
+          <p:nvPr/>
+        </p:nvSpPr>
+        <p:spPr>
+          <a:xfrm rot="8232473">
+            <a:off x="8068677" y="193245"/>
+            <a:ext cx="1143412" cy="1181042"/>
+          </a:xfrm>
+          <a:prstGeom prst="teardrop">
+            <a:avLst/>
+          </a:prstGeom>
+          <a:solidFill>
+            <a:srgbClr val="38B600"/>
+          </a:solidFill>
+          <a:ln>
+            <a:solidFill>
+              <a:srgbClr val="38B600"/>
+            </a:solidFill>
+          </a:ln>
+        </p:spPr>
+        <p:style>
+          <a:lnRef idx="2">
+            <a:schemeClr val="accent1">
+              <a:shade val="50000"/>
+            </a:schemeClr>
+          </a:lnRef>
+          <a:fillRef idx="1">
+            <a:schemeClr val="accent1"/>
+          </a:fillRef>
+          <a:effectRef idx="0">
+            <a:schemeClr val="accent1"/>
+          </a:effectRef>
+          <a:fontRef idx="minor">
+            <a:schemeClr val="lt1"/>
+          </a:fontRef>
+        </p:style>
+        <p:txBody>
+          <a:bodyPr rtlCol="0" anchor="ctr"/>
+          <a:lstStyle/>
+          <a:p>
+            <a:pPr algn="ctr"/>
+            <a:endParaRPr lang="en-US" dirty="0"/>
+          </a:p>
+        </p:txBody>
+      </p:sp>
+      <p:sp>
+        <p:nvSpPr>
           <p:cNvPr id="36" name="ZoneTexte 35"/>
           <p:cNvSpPr txBox="1"/>
           <p:nvPr/>
@@ -4263,7 +4262,7 @@
           </a:solidFill>
           <a:ln>
             <a:solidFill>
-              <a:schemeClr val="bg1"/>
+              <a:srgbClr val="E663F2"/>
             </a:solidFill>
           </a:ln>
         </p:spPr>
@@ -4524,7 +4523,7 @@
           </a:solidFill>
           <a:ln>
             <a:solidFill>
-              <a:schemeClr val="bg1"/>
+              <a:srgbClr val="A2A400"/>
             </a:solidFill>
           </a:ln>
         </p:spPr>
@@ -4587,6 +4586,183 @@
             <a:endParaRPr lang="en-US" sz="1600" dirty="0">
               <a:solidFill>
                 <a:schemeClr val="bg1"/>
+              </a:solidFill>
+            </a:endParaRPr>
+          </a:p>
+        </p:txBody>
+      </p:sp>
+      <p:cxnSp>
+        <p:nvCxnSpPr>
+          <p:cNvPr id="48" name="Connecteur droit 47"/>
+          <p:cNvCxnSpPr>
+            <a:stCxn id="8" idx="0"/>
+          </p:cNvCxnSpPr>
+          <p:nvPr/>
+        </p:nvCxnSpPr>
+        <p:spPr>
+          <a:xfrm flipV="1">
+            <a:off x="3546019" y="-8467"/>
+            <a:ext cx="6610" cy="3931271"/>
+          </a:xfrm>
+          <a:prstGeom prst="line">
+            <a:avLst/>
+          </a:prstGeom>
+          <a:ln w="38100">
+            <a:solidFill>
+              <a:schemeClr val="tx1"/>
+            </a:solidFill>
+          </a:ln>
+        </p:spPr>
+        <p:style>
+          <a:lnRef idx="1">
+            <a:schemeClr val="accent1"/>
+          </a:lnRef>
+          <a:fillRef idx="0">
+            <a:schemeClr val="accent1"/>
+          </a:fillRef>
+          <a:effectRef idx="0">
+            <a:schemeClr val="accent1"/>
+          </a:effectRef>
+          <a:fontRef idx="minor">
+            <a:schemeClr val="tx1"/>
+          </a:fontRef>
+        </p:style>
+      </p:cxnSp>
+      <p:sp>
+        <p:nvSpPr>
+          <p:cNvPr id="4" name="Flèche droite 3"/>
+          <p:cNvSpPr/>
+          <p:nvPr/>
+        </p:nvSpPr>
+        <p:spPr>
+          <a:xfrm rot="10800000">
+            <a:off x="1216723" y="-8468"/>
+            <a:ext cx="1862319" cy="1174137"/>
+          </a:xfrm>
+          <a:prstGeom prst="rightArrow">
+            <a:avLst>
+              <a:gd name="adj1" fmla="val 66242"/>
+              <a:gd name="adj2" fmla="val 50580"/>
+            </a:avLst>
+          </a:prstGeom>
+          <a:gradFill flip="none" rotWithShape="1">
+            <a:gsLst>
+              <a:gs pos="23000">
+                <a:schemeClr val="accent1">
+                  <a:lumMod val="5000"/>
+                  <a:lumOff val="95000"/>
+                </a:schemeClr>
+              </a:gs>
+              <a:gs pos="64000">
+                <a:schemeClr val="bg2">
+                  <a:lumMod val="90000"/>
+                </a:schemeClr>
+              </a:gs>
+              <a:gs pos="78000">
+                <a:schemeClr val="bg2">
+                  <a:lumMod val="75000"/>
+                </a:schemeClr>
+              </a:gs>
+              <a:gs pos="100000">
+                <a:schemeClr val="bg2">
+                  <a:lumMod val="50000"/>
+                </a:schemeClr>
+              </a:gs>
+            </a:gsLst>
+            <a:lin ang="0" scaled="1"/>
+            <a:tileRect/>
+          </a:gradFill>
+          <a:ln>
+            <a:noFill/>
+          </a:ln>
+        </p:spPr>
+        <p:style>
+          <a:lnRef idx="2">
+            <a:schemeClr val="accent1">
+              <a:shade val="50000"/>
+            </a:schemeClr>
+          </a:lnRef>
+          <a:fillRef idx="1">
+            <a:schemeClr val="accent1"/>
+          </a:fillRef>
+          <a:effectRef idx="0">
+            <a:schemeClr val="accent1"/>
+          </a:effectRef>
+          <a:fontRef idx="minor">
+            <a:schemeClr val="lt1"/>
+          </a:fontRef>
+        </p:style>
+        <p:txBody>
+          <a:bodyPr rtlCol="0" anchor="ctr"/>
+          <a:lstStyle/>
+          <a:p>
+            <a:pPr algn="ctr"/>
+            <a:endParaRPr lang="en-US"/>
+          </a:p>
+        </p:txBody>
+      </p:sp>
+      <p:sp>
+        <p:nvSpPr>
+          <p:cNvPr id="3" name="Rectangle à coins arrondis 2"/>
+          <p:cNvSpPr/>
+          <p:nvPr/>
+        </p:nvSpPr>
+        <p:spPr>
+          <a:xfrm>
+            <a:off x="1882668" y="264714"/>
+            <a:ext cx="1660424" cy="640205"/>
+          </a:xfrm>
+          <a:prstGeom prst="roundRect">
+            <a:avLst/>
+          </a:prstGeom>
+          <a:noFill/>
+          <a:ln>
+            <a:noFill/>
+          </a:ln>
+        </p:spPr>
+        <p:style>
+          <a:lnRef idx="2">
+            <a:schemeClr val="accent1">
+              <a:shade val="50000"/>
+            </a:schemeClr>
+          </a:lnRef>
+          <a:fillRef idx="1">
+            <a:schemeClr val="accent1"/>
+          </a:fillRef>
+          <a:effectRef idx="0">
+            <a:schemeClr val="accent1"/>
+          </a:effectRef>
+          <a:fontRef idx="minor">
+            <a:schemeClr val="lt1"/>
+          </a:fontRef>
+        </p:style>
+        <p:txBody>
+          <a:bodyPr rtlCol="0" anchor="ctr"/>
+          <a:lstStyle/>
+          <a:p>
+            <a:pPr algn="r"/>
+            <a:r>
+              <a:rPr lang="en-US" sz="1400" dirty="0">
+                <a:solidFill>
+                  <a:schemeClr val="tx1"/>
+                </a:solidFill>
+              </a:rPr>
+              <a:t>Before 2000</a:t>
+            </a:r>
+          </a:p>
+          <a:p>
+            <a:pPr algn="r"/>
+            <a:r>
+              <a:rPr lang="en-US" sz="1400" dirty="0">
+                <a:solidFill>
+                  <a:schemeClr val="tx1"/>
+                </a:solidFill>
+              </a:rPr>
+              <a:t>(start of time series coverage)</a:t>
+            </a:r>
+            <a:endParaRPr lang="en-US" sz="1400" dirty="0">
+              <a:solidFill>
+                <a:schemeClr val="tx1"/>
               </a:solidFill>
             </a:endParaRPr>
           </a:p>

</xml_diff>